<commit_message>
implementation of more tests
</commit_message>
<xml_diff>
--- a/presentation/MichellCorreia_Apresentacao_Projeto_IDP.pptx
+++ b/presentation/MichellCorreia_Apresentacao_Projeto_IDP.pptx
@@ -1138,7 +1138,7 @@
           <a:p>
             <a:fld id="{CFFFD585-73AF-41C4-A63B-A10B71F3259F}" type="datetimeFigureOut">
               <a:rPr lang="en-US" smtClean="0"/>
-              <a:t>5/19/2022</a:t>
+              <a:t>5/20/2022</a:t>
             </a:fld>
             <a:endParaRPr lang="en-US"/>
           </a:p>
@@ -1462,7 +1462,7 @@
           <a:p>
             <a:fld id="{CFFFD585-73AF-41C4-A63B-A10B71F3259F}" type="datetimeFigureOut">
               <a:rPr lang="en-US" smtClean="0"/>
-              <a:t>5/19/2022</a:t>
+              <a:t>5/20/2022</a:t>
             </a:fld>
             <a:endParaRPr lang="en-US"/>
           </a:p>
@@ -1710,7 +1710,7 @@
           <a:p>
             <a:fld id="{CFFFD585-73AF-41C4-A63B-A10B71F3259F}" type="datetimeFigureOut">
               <a:rPr lang="en-US" smtClean="0"/>
-              <a:t>5/19/2022</a:t>
+              <a:t>5/20/2022</a:t>
             </a:fld>
             <a:endParaRPr lang="en-US"/>
           </a:p>
@@ -2049,7 +2049,7 @@
           <a:p>
             <a:fld id="{CFFFD585-73AF-41C4-A63B-A10B71F3259F}" type="datetimeFigureOut">
               <a:rPr lang="en-US" smtClean="0"/>
-              <a:t>5/19/2022</a:t>
+              <a:t>5/20/2022</a:t>
             </a:fld>
             <a:endParaRPr lang="en-US"/>
           </a:p>
@@ -2396,7 +2396,7 @@
           <a:p>
             <a:fld id="{CFFFD585-73AF-41C4-A63B-A10B71F3259F}" type="datetimeFigureOut">
               <a:rPr lang="en-US" smtClean="0"/>
-              <a:t>5/19/2022</a:t>
+              <a:t>5/20/2022</a:t>
             </a:fld>
             <a:endParaRPr lang="en-US"/>
           </a:p>
@@ -2770,7 +2770,7 @@
           <a:p>
             <a:fld id="{CFFFD585-73AF-41C4-A63B-A10B71F3259F}" type="datetimeFigureOut">
               <a:rPr lang="en-US" smtClean="0"/>
-              <a:t>5/19/2022</a:t>
+              <a:t>5/20/2022</a:t>
             </a:fld>
             <a:endParaRPr lang="en-US"/>
           </a:p>
@@ -3240,7 +3240,7 @@
           <a:p>
             <a:fld id="{CFFFD585-73AF-41C4-A63B-A10B71F3259F}" type="datetimeFigureOut">
               <a:rPr lang="en-US" smtClean="0"/>
-              <a:t>5/19/2022</a:t>
+              <a:t>5/20/2022</a:t>
             </a:fld>
             <a:endParaRPr lang="en-US"/>
           </a:p>
@@ -3445,7 +3445,7 @@
           <a:p>
             <a:fld id="{CFFFD585-73AF-41C4-A63B-A10B71F3259F}" type="datetimeFigureOut">
               <a:rPr lang="en-US" smtClean="0"/>
-              <a:t>5/19/2022</a:t>
+              <a:t>5/20/2022</a:t>
             </a:fld>
             <a:endParaRPr lang="en-US"/>
           </a:p>
@@ -3656,7 +3656,7 @@
           <a:p>
             <a:fld id="{CFFFD585-73AF-41C4-A63B-A10B71F3259F}" type="datetimeFigureOut">
               <a:rPr lang="en-US" smtClean="0"/>
-              <a:t>5/19/2022</a:t>
+              <a:t>5/20/2022</a:t>
             </a:fld>
             <a:endParaRPr lang="en-US"/>
           </a:p>
@@ -3888,7 +3888,7 @@
           <a:p>
             <a:fld id="{CFFFD585-73AF-41C4-A63B-A10B71F3259F}" type="datetimeFigureOut">
               <a:rPr lang="en-US" smtClean="0"/>
-              <a:t>5/19/2022</a:t>
+              <a:t>5/20/2022</a:t>
             </a:fld>
             <a:endParaRPr lang="en-US"/>
           </a:p>
@@ -4136,7 +4136,7 @@
           <a:p>
             <a:fld id="{CFFFD585-73AF-41C4-A63B-A10B71F3259F}" type="datetimeFigureOut">
               <a:rPr lang="en-US" smtClean="0"/>
-              <a:t>5/19/2022</a:t>
+              <a:t>5/20/2022</a:t>
             </a:fld>
             <a:endParaRPr lang="en-US"/>
           </a:p>
@@ -4434,7 +4434,7 @@
           <a:p>
             <a:fld id="{CFFFD585-73AF-41C4-A63B-A10B71F3259F}" type="datetimeFigureOut">
               <a:rPr lang="en-US" smtClean="0"/>
-              <a:t>5/19/2022</a:t>
+              <a:t>5/20/2022</a:t>
             </a:fld>
             <a:endParaRPr lang="en-US"/>
           </a:p>
@@ -4828,7 +4828,7 @@
           <a:p>
             <a:fld id="{CFFFD585-73AF-41C4-A63B-A10B71F3259F}" type="datetimeFigureOut">
               <a:rPr lang="en-US" smtClean="0"/>
-              <a:t>5/19/2022</a:t>
+              <a:t>5/20/2022</a:t>
             </a:fld>
             <a:endParaRPr lang="en-US"/>
           </a:p>
@@ -4977,7 +4977,7 @@
           <a:p>
             <a:fld id="{CFFFD585-73AF-41C4-A63B-A10B71F3259F}" type="datetimeFigureOut">
               <a:rPr lang="en-US" smtClean="0"/>
-              <a:t>5/19/2022</a:t>
+              <a:t>5/20/2022</a:t>
             </a:fld>
             <a:endParaRPr lang="en-US"/>
           </a:p>
@@ -5103,7 +5103,7 @@
           <a:p>
             <a:fld id="{CFFFD585-73AF-41C4-A63B-A10B71F3259F}" type="datetimeFigureOut">
               <a:rPr lang="en-US" smtClean="0"/>
-              <a:t>5/19/2022</a:t>
+              <a:t>5/20/2022</a:t>
             </a:fld>
             <a:endParaRPr lang="en-US"/>
           </a:p>
@@ -5358,7 +5358,7 @@
           <a:p>
             <a:fld id="{CFFFD585-73AF-41C4-A63B-A10B71F3259F}" type="datetimeFigureOut">
               <a:rPr lang="en-US" smtClean="0"/>
-              <a:t>5/19/2022</a:t>
+              <a:t>5/20/2022</a:t>
             </a:fld>
             <a:endParaRPr lang="en-US"/>
           </a:p>
@@ -5673,7 +5673,7 @@
           <a:p>
             <a:fld id="{CFFFD585-73AF-41C4-A63B-A10B71F3259F}" type="datetimeFigureOut">
               <a:rPr lang="en-US" smtClean="0"/>
-              <a:t>5/19/2022</a:t>
+              <a:t>5/20/2022</a:t>
             </a:fld>
             <a:endParaRPr lang="en-US"/>
           </a:p>
@@ -6024,7 +6024,7 @@
           <a:p>
             <a:fld id="{CFFFD585-73AF-41C4-A63B-A10B71F3259F}" type="datetimeFigureOut">
               <a:rPr lang="en-US" smtClean="0"/>
-              <a:t>5/19/2022</a:t>
+              <a:t>5/20/2022</a:t>
             </a:fld>
             <a:endParaRPr lang="en-US"/>
           </a:p>
@@ -9748,8 +9748,985 @@
         </p:blipFill>
         <p:spPr bwMode="auto">
           <a:xfrm>
-            <a:off x="4829175" y="3005668"/>
-            <a:ext cx="2533650" cy="2533650"/>
+            <a:off x="5872764" y="2158669"/>
+            <a:ext cx="650828" cy="650828"/>
+          </a:xfrm>
+          <a:prstGeom prst="rect">
+            <a:avLst/>
+          </a:prstGeom>
+          <a:noFill/>
+          <a:extLst>
+            <a:ext uri="{909E8E84-426E-40DD-AFC4-6F175D3DCCD1}">
+              <a14:hiddenFill xmlns:a14="http://schemas.microsoft.com/office/drawing/2010/main">
+                <a:solidFill>
+                  <a:srgbClr val="FFFFFF"/>
+                </a:solidFill>
+              </a14:hiddenFill>
+            </a:ext>
+          </a:extLst>
+        </p:spPr>
+      </p:pic>
+      <p:sp>
+        <p:nvSpPr>
+          <p:cNvPr id="4" name="Rectangle 3">
+            <a:extLst>
+              <a:ext uri="{FF2B5EF4-FFF2-40B4-BE49-F238E27FC236}">
+                <a16:creationId xmlns:a16="http://schemas.microsoft.com/office/drawing/2014/main" id="{7D0495B6-C8C1-49FD-A4DD-E4B7122BA105}"/>
+              </a:ext>
+            </a:extLst>
+          </p:cNvPr>
+          <p:cNvSpPr/>
+          <p:nvPr/>
+        </p:nvSpPr>
+        <p:spPr>
+          <a:xfrm>
+            <a:off x="5399714" y="4020762"/>
+            <a:ext cx="1560352" cy="511728"/>
+          </a:xfrm>
+          <a:prstGeom prst="rect">
+            <a:avLst/>
+          </a:prstGeom>
+          <a:ln>
+            <a:headEnd type="none" w="med" len="med"/>
+            <a:tailEnd type="none" w="med" len="med"/>
+          </a:ln>
+        </p:spPr>
+        <p:style>
+          <a:lnRef idx="0">
+            <a:schemeClr val="dk1"/>
+          </a:lnRef>
+          <a:fillRef idx="3">
+            <a:schemeClr val="dk1"/>
+          </a:fillRef>
+          <a:effectRef idx="3">
+            <a:schemeClr val="dk1"/>
+          </a:effectRef>
+          <a:fontRef idx="minor">
+            <a:schemeClr val="lt1"/>
+          </a:fontRef>
+        </p:style>
+        <p:txBody>
+          <a:bodyPr rtlCol="0" anchor="ctr"/>
+          <a:lstStyle/>
+          <a:p>
+            <a:pPr algn="ctr"/>
+            <a:endParaRPr lang="en-US"/>
+          </a:p>
+        </p:txBody>
+      </p:sp>
+      <p:sp>
+        <p:nvSpPr>
+          <p:cNvPr id="5" name="TextBox 4">
+            <a:extLst>
+              <a:ext uri="{FF2B5EF4-FFF2-40B4-BE49-F238E27FC236}">
+                <a16:creationId xmlns:a16="http://schemas.microsoft.com/office/drawing/2014/main" id="{71365E47-94DC-4C87-8089-626A2639AC5E}"/>
+              </a:ext>
+            </a:extLst>
+          </p:cNvPr>
+          <p:cNvSpPr txBox="1"/>
+          <p:nvPr/>
+        </p:nvSpPr>
+        <p:spPr>
+          <a:xfrm>
+            <a:off x="5666764" y="4107349"/>
+            <a:ext cx="1026251" cy="338554"/>
+          </a:xfrm>
+          <a:prstGeom prst="rect">
+            <a:avLst/>
+          </a:prstGeom>
+          <a:noFill/>
+        </p:spPr>
+        <p:txBody>
+          <a:bodyPr wrap="square" rtlCol="0">
+            <a:spAutoFit/>
+          </a:bodyPr>
+          <a:lstStyle/>
+          <a:p>
+            <a:r>
+              <a:rPr lang="en-US" sz="1600" dirty="0">
+                <a:solidFill>
+                  <a:schemeClr val="bg1"/>
+                </a:solidFill>
+              </a:rPr>
+              <a:t>Quotation</a:t>
+            </a:r>
+          </a:p>
+        </p:txBody>
+      </p:sp>
+      <p:sp>
+        <p:nvSpPr>
+          <p:cNvPr id="6" name="Rectangle 5">
+            <a:extLst>
+              <a:ext uri="{FF2B5EF4-FFF2-40B4-BE49-F238E27FC236}">
+                <a16:creationId xmlns:a16="http://schemas.microsoft.com/office/drawing/2014/main" id="{44729128-662F-44D5-A613-5013ACB5B9E1}"/>
+              </a:ext>
+            </a:extLst>
+          </p:cNvPr>
+          <p:cNvSpPr/>
+          <p:nvPr/>
+        </p:nvSpPr>
+        <p:spPr>
+          <a:xfrm>
+            <a:off x="5399712" y="5088259"/>
+            <a:ext cx="1560352" cy="511728"/>
+          </a:xfrm>
+          <a:prstGeom prst="rect">
+            <a:avLst/>
+          </a:prstGeom>
+          <a:ln>
+            <a:headEnd type="none" w="med" len="med"/>
+            <a:tailEnd type="none" w="med" len="med"/>
+          </a:ln>
+        </p:spPr>
+        <p:style>
+          <a:lnRef idx="0">
+            <a:schemeClr val="dk1"/>
+          </a:lnRef>
+          <a:fillRef idx="3">
+            <a:schemeClr val="dk1"/>
+          </a:fillRef>
+          <a:effectRef idx="3">
+            <a:schemeClr val="dk1"/>
+          </a:effectRef>
+          <a:fontRef idx="minor">
+            <a:schemeClr val="lt1"/>
+          </a:fontRef>
+        </p:style>
+        <p:txBody>
+          <a:bodyPr rtlCol="0" anchor="ctr"/>
+          <a:lstStyle/>
+          <a:p>
+            <a:pPr algn="ctr"/>
+            <a:endParaRPr lang="en-US" dirty="0"/>
+          </a:p>
+        </p:txBody>
+      </p:sp>
+      <p:sp>
+        <p:nvSpPr>
+          <p:cNvPr id="7" name="TextBox 6">
+            <a:extLst>
+              <a:ext uri="{FF2B5EF4-FFF2-40B4-BE49-F238E27FC236}">
+                <a16:creationId xmlns:a16="http://schemas.microsoft.com/office/drawing/2014/main" id="{F0B98DB1-1E8F-4797-B9A4-A66F8BDD3E7B}"/>
+              </a:ext>
+            </a:extLst>
+          </p:cNvPr>
+          <p:cNvSpPr txBox="1"/>
+          <p:nvPr/>
+        </p:nvSpPr>
+        <p:spPr>
+          <a:xfrm>
+            <a:off x="5836183" y="5174846"/>
+            <a:ext cx="687409" cy="338554"/>
+          </a:xfrm>
+          <a:prstGeom prst="rect">
+            <a:avLst/>
+          </a:prstGeom>
+          <a:noFill/>
+        </p:spPr>
+        <p:txBody>
+          <a:bodyPr wrap="square" rtlCol="0">
+            <a:spAutoFit/>
+          </a:bodyPr>
+          <a:lstStyle/>
+          <a:p>
+            <a:r>
+              <a:rPr lang="en-US" sz="1600" dirty="0">
+                <a:solidFill>
+                  <a:schemeClr val="bg1"/>
+                </a:solidFill>
+              </a:rPr>
+              <a:t>Quote</a:t>
+            </a:r>
+          </a:p>
+        </p:txBody>
+      </p:sp>
+      <p:cxnSp>
+        <p:nvCxnSpPr>
+          <p:cNvPr id="8" name="Straight Connector 7">
+            <a:extLst>
+              <a:ext uri="{FF2B5EF4-FFF2-40B4-BE49-F238E27FC236}">
+                <a16:creationId xmlns:a16="http://schemas.microsoft.com/office/drawing/2014/main" id="{4725A2B0-4834-4131-9F32-98E6599E66B9}"/>
+              </a:ext>
+            </a:extLst>
+          </p:cNvPr>
+          <p:cNvCxnSpPr>
+            <a:cxnSpLocks/>
+            <a:stCxn id="10" idx="2"/>
+            <a:endCxn id="4" idx="0"/>
+          </p:cNvCxnSpPr>
+          <p:nvPr/>
+        </p:nvCxnSpPr>
+        <p:spPr>
+          <a:xfrm>
+            <a:off x="6179888" y="3464993"/>
+            <a:ext cx="2" cy="555769"/>
+          </a:xfrm>
+          <a:prstGeom prst="line">
+            <a:avLst/>
+          </a:prstGeom>
+        </p:spPr>
+        <p:style>
+          <a:lnRef idx="3">
+            <a:schemeClr val="dk1"/>
+          </a:lnRef>
+          <a:fillRef idx="0">
+            <a:schemeClr val="dk1"/>
+          </a:fillRef>
+          <a:effectRef idx="2">
+            <a:schemeClr val="dk1"/>
+          </a:effectRef>
+          <a:fontRef idx="minor">
+            <a:schemeClr val="tx1"/>
+          </a:fontRef>
+        </p:style>
+      </p:cxnSp>
+      <p:cxnSp>
+        <p:nvCxnSpPr>
+          <p:cNvPr id="9" name="Straight Connector 8">
+            <a:extLst>
+              <a:ext uri="{FF2B5EF4-FFF2-40B4-BE49-F238E27FC236}">
+                <a16:creationId xmlns:a16="http://schemas.microsoft.com/office/drawing/2014/main" id="{284FE93F-F228-4C83-8EEF-4B43074D579A}"/>
+              </a:ext>
+            </a:extLst>
+          </p:cNvPr>
+          <p:cNvCxnSpPr>
+            <a:cxnSpLocks/>
+            <a:stCxn id="4" idx="2"/>
+            <a:endCxn id="6" idx="0"/>
+          </p:cNvCxnSpPr>
+          <p:nvPr/>
+        </p:nvCxnSpPr>
+        <p:spPr>
+          <a:xfrm flipH="1">
+            <a:off x="6179888" y="4532490"/>
+            <a:ext cx="2" cy="555769"/>
+          </a:xfrm>
+          <a:prstGeom prst="line">
+            <a:avLst/>
+          </a:prstGeom>
+        </p:spPr>
+        <p:style>
+          <a:lnRef idx="3">
+            <a:schemeClr val="dk1"/>
+          </a:lnRef>
+          <a:fillRef idx="0">
+            <a:schemeClr val="dk1"/>
+          </a:fillRef>
+          <a:effectRef idx="2">
+            <a:schemeClr val="dk1"/>
+          </a:effectRef>
+          <a:fontRef idx="minor">
+            <a:schemeClr val="tx1"/>
+          </a:fontRef>
+        </p:style>
+      </p:cxnSp>
+      <p:sp>
+        <p:nvSpPr>
+          <p:cNvPr id="10" name="Rectangle 9">
+            <a:extLst>
+              <a:ext uri="{FF2B5EF4-FFF2-40B4-BE49-F238E27FC236}">
+                <a16:creationId xmlns:a16="http://schemas.microsoft.com/office/drawing/2014/main" id="{2BEFB386-94A2-4CA2-A748-F754F0B5FAEA}"/>
+              </a:ext>
+            </a:extLst>
+          </p:cNvPr>
+          <p:cNvSpPr/>
+          <p:nvPr/>
+        </p:nvSpPr>
+        <p:spPr>
+          <a:xfrm>
+            <a:off x="5399712" y="2953265"/>
+            <a:ext cx="1560352" cy="511728"/>
+          </a:xfrm>
+          <a:prstGeom prst="rect">
+            <a:avLst/>
+          </a:prstGeom>
+          <a:ln>
+            <a:headEnd type="none" w="med" len="med"/>
+            <a:tailEnd type="none" w="med" len="med"/>
+          </a:ln>
+        </p:spPr>
+        <p:style>
+          <a:lnRef idx="0">
+            <a:schemeClr val="dk1"/>
+          </a:lnRef>
+          <a:fillRef idx="3">
+            <a:schemeClr val="dk1"/>
+          </a:fillRef>
+          <a:effectRef idx="3">
+            <a:schemeClr val="dk1"/>
+          </a:effectRef>
+          <a:fontRef idx="minor">
+            <a:schemeClr val="lt1"/>
+          </a:fontRef>
+        </p:style>
+        <p:txBody>
+          <a:bodyPr rtlCol="0" anchor="ctr"/>
+          <a:lstStyle/>
+          <a:p>
+            <a:pPr algn="ctr"/>
+            <a:endParaRPr lang="en-US"/>
+          </a:p>
+        </p:txBody>
+      </p:sp>
+      <p:sp>
+        <p:nvSpPr>
+          <p:cNvPr id="12" name="TextBox 11">
+            <a:extLst>
+              <a:ext uri="{FF2B5EF4-FFF2-40B4-BE49-F238E27FC236}">
+                <a16:creationId xmlns:a16="http://schemas.microsoft.com/office/drawing/2014/main" id="{1B50EAEB-EDC3-478E-AE6B-5D160E647CAA}"/>
+              </a:ext>
+            </a:extLst>
+          </p:cNvPr>
+          <p:cNvSpPr txBox="1"/>
+          <p:nvPr/>
+        </p:nvSpPr>
+        <p:spPr>
+          <a:xfrm>
+            <a:off x="5833143" y="3039852"/>
+            <a:ext cx="693490" cy="338554"/>
+          </a:xfrm>
+          <a:prstGeom prst="rect">
+            <a:avLst/>
+          </a:prstGeom>
+          <a:noFill/>
+        </p:spPr>
+        <p:txBody>
+          <a:bodyPr wrap="square" rtlCol="0">
+            <a:spAutoFit/>
+          </a:bodyPr>
+          <a:lstStyle/>
+          <a:p>
+            <a:r>
+              <a:rPr lang="en-US" sz="1600" dirty="0">
+                <a:ln w="0"/>
+                <a:solidFill>
+                  <a:schemeClr val="bg1"/>
+                </a:solidFill>
+                <a:effectLst>
+                  <a:outerShdw blurRad="38100" dist="19050" dir="2700000" algn="tl" rotWithShape="0">
+                    <a:schemeClr val="dk1">
+                      <a:alpha val="40000"/>
+                    </a:schemeClr>
+                  </a:outerShdw>
+                </a:effectLst>
+              </a:rPr>
+              <a:t>Stock</a:t>
+            </a:r>
+            <a:endParaRPr lang="en-US" sz="1600" dirty="0">
+              <a:solidFill>
+                <a:schemeClr val="bg1"/>
+              </a:solidFill>
+            </a:endParaRPr>
+          </a:p>
+        </p:txBody>
+      </p:sp>
+      <p:sp>
+        <p:nvSpPr>
+          <p:cNvPr id="13" name="TextBox 12">
+            <a:extLst>
+              <a:ext uri="{FF2B5EF4-FFF2-40B4-BE49-F238E27FC236}">
+                <a16:creationId xmlns:a16="http://schemas.microsoft.com/office/drawing/2014/main" id="{E5F054D9-ED13-4926-A2C2-7D5D0B2538BC}"/>
+              </a:ext>
+            </a:extLst>
+          </p:cNvPr>
+          <p:cNvSpPr txBox="1"/>
+          <p:nvPr/>
+        </p:nvSpPr>
+        <p:spPr>
+          <a:xfrm>
+            <a:off x="6179887" y="4863215"/>
+            <a:ext cx="239168" cy="246221"/>
+          </a:xfrm>
+          <a:prstGeom prst="rect">
+            <a:avLst/>
+          </a:prstGeom>
+          <a:noFill/>
+        </p:spPr>
+        <p:txBody>
+          <a:bodyPr wrap="none" rtlCol="0">
+            <a:spAutoFit/>
+          </a:bodyPr>
+          <a:lstStyle/>
+          <a:p>
+            <a:r>
+              <a:rPr lang="en-US" sz="1000" dirty="0"/>
+              <a:t>*</a:t>
+            </a:r>
+          </a:p>
+        </p:txBody>
+      </p:sp>
+      <p:sp>
+        <p:nvSpPr>
+          <p:cNvPr id="14" name="TextBox 13">
+            <a:extLst>
+              <a:ext uri="{FF2B5EF4-FFF2-40B4-BE49-F238E27FC236}">
+                <a16:creationId xmlns:a16="http://schemas.microsoft.com/office/drawing/2014/main" id="{A69730A7-6675-4245-8A54-6C4CFD5CA6F2}"/>
+              </a:ext>
+            </a:extLst>
+          </p:cNvPr>
+          <p:cNvSpPr txBox="1"/>
+          <p:nvPr/>
+        </p:nvSpPr>
+        <p:spPr>
+          <a:xfrm>
+            <a:off x="6176230" y="4511313"/>
+            <a:ext cx="195249" cy="253258"/>
+          </a:xfrm>
+          <a:prstGeom prst="rect">
+            <a:avLst/>
+          </a:prstGeom>
+          <a:noFill/>
+        </p:spPr>
+        <p:txBody>
+          <a:bodyPr wrap="square" rtlCol="0">
+            <a:spAutoFit/>
+          </a:bodyPr>
+          <a:lstStyle/>
+          <a:p>
+            <a:r>
+              <a:rPr lang="en-US" sz="1000" dirty="0"/>
+              <a:t>1</a:t>
+            </a:r>
+          </a:p>
+        </p:txBody>
+      </p:sp>
+      <p:sp>
+        <p:nvSpPr>
+          <p:cNvPr id="15" name="TextBox 14">
+            <a:extLst>
+              <a:ext uri="{FF2B5EF4-FFF2-40B4-BE49-F238E27FC236}">
+                <a16:creationId xmlns:a16="http://schemas.microsoft.com/office/drawing/2014/main" id="{93DF1107-FB29-4B8D-BF36-F5A877FA94A0}"/>
+              </a:ext>
+            </a:extLst>
+          </p:cNvPr>
+          <p:cNvSpPr txBox="1"/>
+          <p:nvPr/>
+        </p:nvSpPr>
+        <p:spPr>
+          <a:xfrm>
+            <a:off x="5937922" y="3811064"/>
+            <a:ext cx="245580" cy="246221"/>
+          </a:xfrm>
+          <a:prstGeom prst="rect">
+            <a:avLst/>
+          </a:prstGeom>
+          <a:noFill/>
+        </p:spPr>
+        <p:txBody>
+          <a:bodyPr wrap="none" rtlCol="0">
+            <a:spAutoFit/>
+          </a:bodyPr>
+          <a:lstStyle/>
+          <a:p>
+            <a:r>
+              <a:rPr lang="en-US" sz="1000" dirty="0"/>
+              <a:t>1</a:t>
+            </a:r>
+          </a:p>
+        </p:txBody>
+      </p:sp>
+      <p:sp>
+        <p:nvSpPr>
+          <p:cNvPr id="16" name="TextBox 15">
+            <a:extLst>
+              <a:ext uri="{FF2B5EF4-FFF2-40B4-BE49-F238E27FC236}">
+                <a16:creationId xmlns:a16="http://schemas.microsoft.com/office/drawing/2014/main" id="{1F6AFE47-CAB7-4BDF-8BFC-B86634B5F322}"/>
+              </a:ext>
+            </a:extLst>
+          </p:cNvPr>
+          <p:cNvSpPr txBox="1"/>
+          <p:nvPr/>
+        </p:nvSpPr>
+        <p:spPr>
+          <a:xfrm>
+            <a:off x="5937922" y="3443816"/>
+            <a:ext cx="245580" cy="246221"/>
+          </a:xfrm>
+          <a:prstGeom prst="rect">
+            <a:avLst/>
+          </a:prstGeom>
+          <a:noFill/>
+        </p:spPr>
+        <p:txBody>
+          <a:bodyPr wrap="none" rtlCol="0">
+            <a:spAutoFit/>
+          </a:bodyPr>
+          <a:lstStyle/>
+          <a:p>
+            <a:r>
+              <a:rPr lang="en-US" sz="1000" dirty="0"/>
+              <a:t>1</a:t>
+            </a:r>
+          </a:p>
+        </p:txBody>
+      </p:sp>
+      <p:pic>
+        <p:nvPicPr>
+          <p:cNvPr id="1026" name="Picture 2" descr="Database - Free technology icons">
+            <a:extLst>
+              <a:ext uri="{FF2B5EF4-FFF2-40B4-BE49-F238E27FC236}">
+                <a16:creationId xmlns:a16="http://schemas.microsoft.com/office/drawing/2014/main" id="{8A67E3EF-CBA0-4230-9885-F5EF8D1EAFEC}"/>
+              </a:ext>
+            </a:extLst>
+          </p:cNvPr>
+          <p:cNvPicPr>
+            <a:picLocks noChangeAspect="1" noChangeArrowheads="1"/>
+          </p:cNvPicPr>
+          <p:nvPr/>
+        </p:nvPicPr>
+        <p:blipFill>
+          <a:blip r:embed="rId3">
+            <a:extLst>
+              <a:ext uri="{28A0092B-C50C-407E-A947-70E740481C1C}">
+                <a14:useLocalDpi xmlns:a14="http://schemas.microsoft.com/office/drawing/2010/main" val="0"/>
+              </a:ext>
+            </a:extLst>
+          </a:blip>
+          <a:srcRect/>
+          <a:stretch>
+            <a:fillRect/>
+          </a:stretch>
+        </p:blipFill>
+        <p:spPr bwMode="auto">
+          <a:xfrm>
+            <a:off x="1685387" y="3342552"/>
+            <a:ext cx="1103351" cy="1103351"/>
+          </a:xfrm>
+          <a:prstGeom prst="rect">
+            <a:avLst/>
+          </a:prstGeom>
+          <a:noFill/>
+          <a:extLst>
+            <a:ext uri="{909E8E84-426E-40DD-AFC4-6F175D3DCCD1}">
+              <a14:hiddenFill xmlns:a14="http://schemas.microsoft.com/office/drawing/2010/main">
+                <a:solidFill>
+                  <a:srgbClr val="FFFFFF"/>
+                </a:solidFill>
+              </a14:hiddenFill>
+            </a:ext>
+          </a:extLst>
+        </p:spPr>
+      </p:pic>
+      <p:sp>
+        <p:nvSpPr>
+          <p:cNvPr id="20" name="TextBox 19">
+            <a:extLst>
+              <a:ext uri="{FF2B5EF4-FFF2-40B4-BE49-F238E27FC236}">
+                <a16:creationId xmlns:a16="http://schemas.microsoft.com/office/drawing/2014/main" id="{31EEADAE-0EBB-446C-A4D9-7DE49A210EAB}"/>
+              </a:ext>
+            </a:extLst>
+          </p:cNvPr>
+          <p:cNvSpPr txBox="1"/>
+          <p:nvPr/>
+        </p:nvSpPr>
+        <p:spPr>
+          <a:xfrm>
+            <a:off x="1965192" y="3086017"/>
+            <a:ext cx="543739" cy="246221"/>
+          </a:xfrm>
+          <a:prstGeom prst="rect">
+            <a:avLst/>
+          </a:prstGeom>
+          <a:noFill/>
+        </p:spPr>
+        <p:txBody>
+          <a:bodyPr wrap="none" rtlCol="0">
+            <a:spAutoFit/>
+          </a:bodyPr>
+          <a:lstStyle/>
+          <a:p>
+            <a:r>
+              <a:rPr lang="en-US" sz="1000" dirty="0"/>
+              <a:t>Mysql8</a:t>
+            </a:r>
+          </a:p>
+        </p:txBody>
+      </p:sp>
+      <p:cxnSp>
+        <p:nvCxnSpPr>
+          <p:cNvPr id="22" name="Straight Arrow Connector 21">
+            <a:extLst>
+              <a:ext uri="{FF2B5EF4-FFF2-40B4-BE49-F238E27FC236}">
+                <a16:creationId xmlns:a16="http://schemas.microsoft.com/office/drawing/2014/main" id="{F0DD3497-32C7-4FCB-850A-2B653B58E8D2}"/>
+              </a:ext>
+            </a:extLst>
+          </p:cNvPr>
+          <p:cNvCxnSpPr>
+            <a:cxnSpLocks/>
+            <a:stCxn id="4" idx="1"/>
+          </p:cNvCxnSpPr>
+          <p:nvPr/>
+        </p:nvCxnSpPr>
+        <p:spPr>
+          <a:xfrm flipH="1">
+            <a:off x="2788738" y="4276626"/>
+            <a:ext cx="2610976" cy="0"/>
+          </a:xfrm>
+          <a:prstGeom prst="straightConnector1">
+            <a:avLst/>
+          </a:prstGeom>
+          <a:ln>
+            <a:tailEnd type="triangle"/>
+          </a:ln>
+        </p:spPr>
+        <p:style>
+          <a:lnRef idx="1">
+            <a:schemeClr val="accent1"/>
+          </a:lnRef>
+          <a:fillRef idx="0">
+            <a:schemeClr val="accent1"/>
+          </a:fillRef>
+          <a:effectRef idx="0">
+            <a:schemeClr val="accent1"/>
+          </a:effectRef>
+          <a:fontRef idx="minor">
+            <a:schemeClr val="tx1"/>
+          </a:fontRef>
+        </p:style>
+      </p:cxnSp>
+      <p:cxnSp>
+        <p:nvCxnSpPr>
+          <p:cNvPr id="24" name="Straight Connector 23">
+            <a:extLst>
+              <a:ext uri="{FF2B5EF4-FFF2-40B4-BE49-F238E27FC236}">
+                <a16:creationId xmlns:a16="http://schemas.microsoft.com/office/drawing/2014/main" id="{E844B362-9B69-41F8-B2A5-EC2873EBB7EF}"/>
+              </a:ext>
+            </a:extLst>
+          </p:cNvPr>
+          <p:cNvCxnSpPr>
+            <a:stCxn id="6" idx="1"/>
+          </p:cNvCxnSpPr>
+          <p:nvPr/>
+        </p:nvCxnSpPr>
+        <p:spPr>
+          <a:xfrm flipH="1">
+            <a:off x="2407140" y="5344123"/>
+            <a:ext cx="2992572" cy="0"/>
+          </a:xfrm>
+          <a:prstGeom prst="line">
+            <a:avLst/>
+          </a:prstGeom>
+        </p:spPr>
+        <p:style>
+          <a:lnRef idx="1">
+            <a:schemeClr val="accent1"/>
+          </a:lnRef>
+          <a:fillRef idx="0">
+            <a:schemeClr val="accent1"/>
+          </a:fillRef>
+          <a:effectRef idx="0">
+            <a:schemeClr val="accent1"/>
+          </a:effectRef>
+          <a:fontRef idx="minor">
+            <a:schemeClr val="tx1"/>
+          </a:fontRef>
+        </p:style>
+      </p:cxnSp>
+      <p:cxnSp>
+        <p:nvCxnSpPr>
+          <p:cNvPr id="26" name="Straight Arrow Connector 25">
+            <a:extLst>
+              <a:ext uri="{FF2B5EF4-FFF2-40B4-BE49-F238E27FC236}">
+                <a16:creationId xmlns:a16="http://schemas.microsoft.com/office/drawing/2014/main" id="{DD72F2A7-37CB-483F-8A0F-522D457AFDDF}"/>
+              </a:ext>
+            </a:extLst>
+          </p:cNvPr>
+          <p:cNvCxnSpPr>
+            <a:cxnSpLocks/>
+          </p:cNvCxnSpPr>
+          <p:nvPr/>
+        </p:nvCxnSpPr>
+        <p:spPr>
+          <a:xfrm flipV="1">
+            <a:off x="2407140" y="4511313"/>
+            <a:ext cx="0" cy="832811"/>
+          </a:xfrm>
+          <a:prstGeom prst="straightConnector1">
+            <a:avLst/>
+          </a:prstGeom>
+          <a:ln>
+            <a:tailEnd type="triangle"/>
+          </a:ln>
+        </p:spPr>
+        <p:style>
+          <a:lnRef idx="1">
+            <a:schemeClr val="accent1"/>
+          </a:lnRef>
+          <a:fillRef idx="0">
+            <a:schemeClr val="accent1"/>
+          </a:fillRef>
+          <a:effectRef idx="0">
+            <a:schemeClr val="accent1"/>
+          </a:effectRef>
+          <a:fontRef idx="minor">
+            <a:schemeClr val="tx1"/>
+          </a:fontRef>
+        </p:style>
+      </p:cxnSp>
+      <p:pic>
+        <p:nvPicPr>
+          <p:cNvPr id="1030" name="Picture 6" descr="Aplicativo desktop - ícones de tecnologia grátis">
+            <a:extLst>
+              <a:ext uri="{FF2B5EF4-FFF2-40B4-BE49-F238E27FC236}">
+                <a16:creationId xmlns:a16="http://schemas.microsoft.com/office/drawing/2014/main" id="{64919E2C-45CB-4A39-8B55-E36C6F5899CC}"/>
+              </a:ext>
+            </a:extLst>
+          </p:cNvPr>
+          <p:cNvPicPr>
+            <a:picLocks noChangeAspect="1" noChangeArrowheads="1"/>
+          </p:cNvPicPr>
+          <p:nvPr/>
+        </p:nvPicPr>
+        <p:blipFill>
+          <a:blip r:embed="rId4">
+            <a:extLst>
+              <a:ext uri="{28A0092B-C50C-407E-A947-70E740481C1C}">
+                <a14:useLocalDpi xmlns:a14="http://schemas.microsoft.com/office/drawing/2010/main" val="0"/>
+              </a:ext>
+            </a:extLst>
+          </a:blip>
+          <a:srcRect/>
+          <a:stretch>
+            <a:fillRect/>
+          </a:stretch>
+        </p:blipFill>
+        <p:spPr bwMode="auto">
+          <a:xfrm>
+            <a:off x="9565991" y="3416000"/>
+            <a:ext cx="1036347" cy="1036347"/>
+          </a:xfrm>
+          <a:prstGeom prst="rect">
+            <a:avLst/>
+          </a:prstGeom>
+          <a:noFill/>
+          <a:extLst>
+            <a:ext uri="{909E8E84-426E-40DD-AFC4-6F175D3DCCD1}">
+              <a14:hiddenFill xmlns:a14="http://schemas.microsoft.com/office/drawing/2010/main">
+                <a:solidFill>
+                  <a:srgbClr val="FFFFFF"/>
+                </a:solidFill>
+              </a14:hiddenFill>
+            </a:ext>
+          </a:extLst>
+        </p:spPr>
+      </p:pic>
+      <p:sp>
+        <p:nvSpPr>
+          <p:cNvPr id="32" name="TextBox 31">
+            <a:extLst>
+              <a:ext uri="{FF2B5EF4-FFF2-40B4-BE49-F238E27FC236}">
+                <a16:creationId xmlns:a16="http://schemas.microsoft.com/office/drawing/2014/main" id="{ACF4F1C7-1D55-477E-B0A7-7FBEDDA71B23}"/>
+              </a:ext>
+            </a:extLst>
+          </p:cNvPr>
+          <p:cNvSpPr txBox="1"/>
+          <p:nvPr/>
+        </p:nvSpPr>
+        <p:spPr>
+          <a:xfrm>
+            <a:off x="9616728" y="3096331"/>
+            <a:ext cx="934871" cy="246221"/>
+          </a:xfrm>
+          <a:prstGeom prst="rect">
+            <a:avLst/>
+          </a:prstGeom>
+          <a:noFill/>
+        </p:spPr>
+        <p:txBody>
+          <a:bodyPr wrap="none" rtlCol="0">
+            <a:spAutoFit/>
+          </a:bodyPr>
+          <a:lstStyle/>
+          <a:p>
+            <a:r>
+              <a:rPr lang="en-US" sz="1000" dirty="0"/>
+              <a:t>Stock-Manager</a:t>
+            </a:r>
+          </a:p>
+        </p:txBody>
+      </p:sp>
+      <p:cxnSp>
+        <p:nvCxnSpPr>
+          <p:cNvPr id="30" name="Straight Connector 29">
+            <a:extLst>
+              <a:ext uri="{FF2B5EF4-FFF2-40B4-BE49-F238E27FC236}">
+                <a16:creationId xmlns:a16="http://schemas.microsoft.com/office/drawing/2014/main" id="{74A35870-8EAE-4C48-A82F-27FB00EA4091}"/>
+              </a:ext>
+            </a:extLst>
+          </p:cNvPr>
+          <p:cNvCxnSpPr>
+            <a:stCxn id="10" idx="3"/>
+          </p:cNvCxnSpPr>
+          <p:nvPr/>
+        </p:nvCxnSpPr>
+        <p:spPr>
+          <a:xfrm flipV="1">
+            <a:off x="6960064" y="3209128"/>
+            <a:ext cx="1286314" cy="1"/>
+          </a:xfrm>
+          <a:prstGeom prst="line">
+            <a:avLst/>
+          </a:prstGeom>
+        </p:spPr>
+        <p:style>
+          <a:lnRef idx="1">
+            <a:schemeClr val="accent1"/>
+          </a:lnRef>
+          <a:fillRef idx="0">
+            <a:schemeClr val="accent1"/>
+          </a:fillRef>
+          <a:effectRef idx="0">
+            <a:schemeClr val="accent1"/>
+          </a:effectRef>
+          <a:fontRef idx="minor">
+            <a:schemeClr val="tx1"/>
+          </a:fontRef>
+        </p:style>
+      </p:cxnSp>
+      <p:cxnSp>
+        <p:nvCxnSpPr>
+          <p:cNvPr id="37" name="Straight Arrow Connector 36">
+            <a:extLst>
+              <a:ext uri="{FF2B5EF4-FFF2-40B4-BE49-F238E27FC236}">
+                <a16:creationId xmlns:a16="http://schemas.microsoft.com/office/drawing/2014/main" id="{0B7FA8C3-2896-42DE-AF0B-66E9E70F476C}"/>
+              </a:ext>
+            </a:extLst>
+          </p:cNvPr>
+          <p:cNvCxnSpPr>
+            <a:endCxn id="1030" idx="1"/>
+          </p:cNvCxnSpPr>
+          <p:nvPr/>
+        </p:nvCxnSpPr>
+        <p:spPr>
+          <a:xfrm>
+            <a:off x="8355435" y="3934173"/>
+            <a:ext cx="1210556" cy="1"/>
+          </a:xfrm>
+          <a:prstGeom prst="straightConnector1">
+            <a:avLst/>
+          </a:prstGeom>
+          <a:ln>
+            <a:tailEnd type="triangle"/>
+          </a:ln>
+        </p:spPr>
+        <p:style>
+          <a:lnRef idx="1">
+            <a:schemeClr val="accent1"/>
+          </a:lnRef>
+          <a:fillRef idx="0">
+            <a:schemeClr val="accent1"/>
+          </a:fillRef>
+          <a:effectRef idx="0">
+            <a:schemeClr val="accent1"/>
+          </a:effectRef>
+          <a:fontRef idx="minor">
+            <a:schemeClr val="tx1"/>
+          </a:fontRef>
+        </p:style>
+      </p:cxnSp>
+      <p:cxnSp>
+        <p:nvCxnSpPr>
+          <p:cNvPr id="39" name="Straight Connector 38">
+            <a:extLst>
+              <a:ext uri="{FF2B5EF4-FFF2-40B4-BE49-F238E27FC236}">
+                <a16:creationId xmlns:a16="http://schemas.microsoft.com/office/drawing/2014/main" id="{48CEB00F-0547-4D1A-B137-FED81B2861CB}"/>
+              </a:ext>
+            </a:extLst>
+          </p:cNvPr>
+          <p:cNvCxnSpPr/>
+          <p:nvPr/>
+        </p:nvCxnSpPr>
+        <p:spPr>
+          <a:xfrm>
+            <a:off x="8246378" y="3209128"/>
+            <a:ext cx="0" cy="725045"/>
+          </a:xfrm>
+          <a:prstGeom prst="line">
+            <a:avLst/>
+          </a:prstGeom>
+        </p:spPr>
+        <p:style>
+          <a:lnRef idx="1">
+            <a:schemeClr val="accent1"/>
+          </a:lnRef>
+          <a:fillRef idx="0">
+            <a:schemeClr val="accent1"/>
+          </a:fillRef>
+          <a:effectRef idx="0">
+            <a:schemeClr val="accent1"/>
+          </a:effectRef>
+          <a:fontRef idx="minor">
+            <a:schemeClr val="tx1"/>
+          </a:fontRef>
+        </p:style>
+      </p:cxnSp>
+      <p:cxnSp>
+        <p:nvCxnSpPr>
+          <p:cNvPr id="41" name="Straight Connector 40">
+            <a:extLst>
+              <a:ext uri="{FF2B5EF4-FFF2-40B4-BE49-F238E27FC236}">
+                <a16:creationId xmlns:a16="http://schemas.microsoft.com/office/drawing/2014/main" id="{D59897DB-4324-4B8B-9089-9AB62D73F78C}"/>
+              </a:ext>
+            </a:extLst>
+          </p:cNvPr>
+          <p:cNvCxnSpPr/>
+          <p:nvPr/>
+        </p:nvCxnSpPr>
+        <p:spPr>
+          <a:xfrm>
+            <a:off x="8246378" y="3934173"/>
+            <a:ext cx="109057" cy="0"/>
+          </a:xfrm>
+          <a:prstGeom prst="line">
+            <a:avLst/>
+          </a:prstGeom>
+        </p:spPr>
+        <p:style>
+          <a:lnRef idx="1">
+            <a:schemeClr val="accent1"/>
+          </a:lnRef>
+          <a:fillRef idx="0">
+            <a:schemeClr val="accent1"/>
+          </a:fillRef>
+          <a:effectRef idx="0">
+            <a:schemeClr val="accent1"/>
+          </a:effectRef>
+          <a:fontRef idx="minor">
+            <a:schemeClr val="tx1"/>
+          </a:fontRef>
+        </p:style>
+      </p:cxnSp>
+      <p:pic>
+        <p:nvPicPr>
+          <p:cNvPr id="45" name="Picture 2" descr="Database - Free technology icons">
+            <a:extLst>
+              <a:ext uri="{FF2B5EF4-FFF2-40B4-BE49-F238E27FC236}">
+                <a16:creationId xmlns:a16="http://schemas.microsoft.com/office/drawing/2014/main" id="{09A128AE-0190-4E4E-9B98-677C7088E16D}"/>
+              </a:ext>
+            </a:extLst>
+          </p:cNvPr>
+          <p:cNvPicPr>
+            <a:picLocks noChangeAspect="1" noChangeArrowheads="1"/>
+          </p:cNvPicPr>
+          <p:nvPr/>
+        </p:nvPicPr>
+        <p:blipFill>
+          <a:blip r:embed="rId3">
+            <a:extLst>
+              <a:ext uri="{28A0092B-C50C-407E-A947-70E740481C1C}">
+                <a14:useLocalDpi xmlns:a14="http://schemas.microsoft.com/office/drawing/2010/main" val="0"/>
+              </a:ext>
+            </a:extLst>
+          </a:blip>
+          <a:srcRect/>
+          <a:stretch>
+            <a:fillRect/>
+          </a:stretch>
+        </p:blipFill>
+        <p:spPr bwMode="auto">
+          <a:xfrm>
+            <a:off x="10384290" y="4276626"/>
+            <a:ext cx="167309" cy="167309"/>
           </a:xfrm>
           <a:prstGeom prst="rect">
             <a:avLst/>
@@ -10669,6 +11646,15 @@
 </file>
 
 <file path=customXml/item1.xml><?xml version="1.0" encoding="utf-8"?>
+<?mso-contentType ?>
+<FormTemplates xmlns="http://schemas.microsoft.com/sharepoint/v3/contenttype/forms">
+  <Display>DocumentLibraryForm</Display>
+  <Edit>DocumentLibraryForm</Edit>
+  <New>DocumentLibraryForm</New>
+</FormTemplates>
+</file>
+
+<file path=customXml/item2.xml><?xml version="1.0" encoding="utf-8"?>
 <ct:contentTypeSchema xmlns:ct="http://schemas.microsoft.com/office/2006/metadata/contentType" xmlns:ma="http://schemas.microsoft.com/office/2006/metadata/properties/metaAttributes" ct:_="" ma:_="" ma:contentTypeName="Document" ma:contentTypeID="0x010100E8DE5B823FB2444CB77E9C9DF232E1F0" ma:contentTypeVersion="8" ma:contentTypeDescription="Create a new document." ma:contentTypeScope="" ma:versionID="42f76f7f15c42f9acec191696ca78985">
   <xsd:schema xmlns:xsd="http://www.w3.org/2001/XMLSchema" xmlns:xs="http://www.w3.org/2001/XMLSchema" xmlns:p="http://schemas.microsoft.com/office/2006/metadata/properties" xmlns:ns3="c1f1da5a-a3a1-4c6c-ac6e-fe279005afce" xmlns:ns4="d2e1e8c0-1a6f-4c5d-a96d-a6f8a537c873" targetNamespace="http://schemas.microsoft.com/office/2006/metadata/properties" ma:root="true" ma:fieldsID="92712287e3b9f6ba80faf945f26b6ee1" ns3:_="" ns4:_="">
     <xsd:import namespace="c1f1da5a-a3a1-4c6c-ac6e-fe279005afce"/>
@@ -10857,15 +11843,6 @@
 </ct:contentTypeSchema>
 </file>
 
-<file path=customXml/item2.xml><?xml version="1.0" encoding="utf-8"?>
-<?mso-contentType ?>
-<FormTemplates xmlns="http://schemas.microsoft.com/sharepoint/v3/contenttype/forms">
-  <Display>DocumentLibraryForm</Display>
-  <Edit>DocumentLibraryForm</Edit>
-  <New>DocumentLibraryForm</New>
-</FormTemplates>
-</file>
-
 <file path=customXml/item3.xml><?xml version="1.0" encoding="utf-8"?>
 <p:properties xmlns:p="http://schemas.microsoft.com/office/2006/metadata/properties" xmlns:xsi="http://www.w3.org/2001/XMLSchema-instance" xmlns:pc="http://schemas.microsoft.com/office/infopath/2007/PartnerControls">
   <documentManagement/>
@@ -10873,6 +11850,14 @@
 </file>
 
 <file path=customXml/itemProps1.xml><?xml version="1.0" encoding="utf-8"?>
+<ds:datastoreItem xmlns:ds="http://schemas.openxmlformats.org/officeDocument/2006/customXml" ds:itemID="{68631B6A-3E49-470A-8C85-98E07BB59D7E}">
+  <ds:schemaRefs>
+    <ds:schemaRef ds:uri="http://schemas.microsoft.com/sharepoint/v3/contenttype/forms"/>
+  </ds:schemaRefs>
+</ds:datastoreItem>
+</file>
+
+<file path=customXml/itemProps2.xml><?xml version="1.0" encoding="utf-8"?>
 <ds:datastoreItem xmlns:ds="http://schemas.openxmlformats.org/officeDocument/2006/customXml" ds:itemID="{3E48E85F-94E3-4648-A5A9-6E2038070B9B}">
   <ds:schemaRefs>
     <ds:schemaRef ds:uri="http://schemas.microsoft.com/office/2006/metadata/contentType"/>
@@ -10887,14 +11872,6 @@
     <ds:schemaRef ds:uri="http://purl.org/dc/elements/1.1/"/>
     <ds:schemaRef ds:uri="http://purl.org/dc/terms/"/>
     <ds:schemaRef ds:uri="http://schemas.microsoft.com/internal/obd"/>
-  </ds:schemaRefs>
-</ds:datastoreItem>
-</file>
-
-<file path=customXml/itemProps2.xml><?xml version="1.0" encoding="utf-8"?>
-<ds:datastoreItem xmlns:ds="http://schemas.openxmlformats.org/officeDocument/2006/customXml" ds:itemID="{68631B6A-3E49-470A-8C85-98E07BB59D7E}">
-  <ds:schemaRefs>
-    <ds:schemaRef ds:uri="http://schemas.microsoft.com/sharepoint/v3/contenttype/forms"/>
   </ds:schemaRefs>
 </ds:datastoreItem>
 </file>

</xml_diff>